<commit_message>
Fixed presentation for review js day.
</commit_message>
<xml_diff>
--- a/05-timers-trivia/1-Class-Content/5.1/Slide-Shows/ReviewJSDay.pptx
+++ b/05-timers-trivia/1-Class-Content/5.1/Slide-Shows/ReviewJSDay.pptx
@@ -1324,7 +1324,7 @@
         <p:spPr>
           <a:xfrm>
             <a:off x="0" y="-1"/>
-            <a:ext cx="9144000" cy="560979"/>
+            <a:ext cx="9144000" cy="560978"/>
           </a:xfrm>
           <a:prstGeom prst="rect">
             <a:avLst/>
@@ -1637,7 +1637,7 @@
         <p:spPr>
           <a:xfrm>
             <a:off x="0" y="653853"/>
-            <a:ext cx="9144001" cy="1"/>
+            <a:ext cx="9144000" cy="1"/>
           </a:xfrm>
           <a:prstGeom prst="line">
             <a:avLst/>
@@ -1724,8 +1724,8 @@
         </p:blipFill>
         <p:spPr>
           <a:xfrm>
-            <a:off x="-5871" y="6400799"/>
-            <a:ext cx="2179730" cy="481356"/>
+            <a:off x="-5871" y="6400800"/>
+            <a:ext cx="2179730" cy="481355"/>
           </a:xfrm>
           <a:prstGeom prst="rect">
             <a:avLst/>
@@ -1864,7 +1864,7 @@
         <p:spPr>
           <a:xfrm>
             <a:off x="0" y="653853"/>
-            <a:ext cx="9144001" cy="1"/>
+            <a:ext cx="9144000" cy="1"/>
           </a:xfrm>
           <a:prstGeom prst="line">
             <a:avLst/>
@@ -2893,7 +2893,7 @@
         <p:spPr>
           <a:xfrm>
             <a:off x="0" y="653853"/>
-            <a:ext cx="9144001" cy="1"/>
+            <a:ext cx="9144000" cy="1"/>
           </a:xfrm>
           <a:prstGeom prst="line">
             <a:avLst/>
@@ -3830,7 +3830,7 @@
         <p:spPr>
           <a:xfrm>
             <a:off x="0" y="653853"/>
-            <a:ext cx="9144001" cy="1"/>
+            <a:ext cx="9144000" cy="1"/>
           </a:xfrm>
           <a:prstGeom prst="line">
             <a:avLst/>
@@ -5004,7 +5004,7 @@
         <p:spPr>
           <a:xfrm>
             <a:off x="390606" y="2953542"/>
-            <a:ext cx="8229601" cy="871860"/>
+            <a:ext cx="8229601" cy="871859"/>
           </a:xfrm>
           <a:prstGeom prst="rect">
             <a:avLst/>
@@ -5030,10 +5030,6 @@
           </p:nvPr>
         </p:nvSpPr>
         <p:spPr>
-          <a:xfrm>
-            <a:off x="3370402" y="4034788"/>
-            <a:ext cx="2270009" cy="381001"/>
-          </a:xfrm>
           <a:prstGeom prst="rect">
             <a:avLst/>
           </a:prstGeom>
@@ -5044,7 +5040,7 @@
           <a:p>
             <a:pPr/>
             <a:r>
-              <a:t>Feb 21, 20176</a:t>
+              <a:t>Feb 21, 2017</a:t>
             </a:r>
           </a:p>
         </p:txBody>
@@ -5921,7 +5917,7 @@
         <p:spPr>
           <a:xfrm>
             <a:off x="390606" y="2953542"/>
-            <a:ext cx="8229601" cy="871860"/>
+            <a:ext cx="8229601" cy="871859"/>
           </a:xfrm>
           <a:prstGeom prst="rect">
             <a:avLst/>
@@ -6728,7 +6724,7 @@
         <p:spPr>
           <a:xfrm>
             <a:off x="390606" y="2953542"/>
-            <a:ext cx="8229601" cy="871860"/>
+            <a:ext cx="8229601" cy="871859"/>
           </a:xfrm>
           <a:prstGeom prst="rect">
             <a:avLst/>
@@ -8253,8 +8249,8 @@
           </p:nvSpPr>
           <p:spPr>
             <a:xfrm>
-              <a:off x="727295" y="1276349"/>
-              <a:ext cx="5352610" cy="1389805"/>
+              <a:off x="727295" y="1276350"/>
+              <a:ext cx="5352610" cy="1389804"/>
             </a:xfrm>
             <a:prstGeom prst="rect">
               <a:avLst/>
@@ -8335,7 +8331,7 @@
           </p:nvSpPr>
           <p:spPr>
             <a:xfrm>
-              <a:off x="451495" y="786886"/>
+              <a:off x="451495" y="786885"/>
               <a:ext cx="238086" cy="358141"/>
             </a:xfrm>
             <a:prstGeom prst="rect">

</xml_diff>